<commit_message>
update slide in processing
</commit_message>
<xml_diff>
--- a/1. Documents/AngularAuthenticationAndAuthorization.pptx
+++ b/1. Documents/AngularAuthenticationAndAuthorization.pptx
@@ -212,7 +212,7 @@
           <a:p>
             <a:fld id="{2FF3A749-B69A-43C0-97E5-57D410257150}" type="datetimeFigureOut">
               <a:rPr lang="en-US" smtClean="0"/>
-              <a:t>3/29/2019</a:t>
+              <a:t>4/4/2019</a:t>
             </a:fld>
             <a:endParaRPr lang="en-US"/>
           </a:p>
@@ -382,7 +382,7 @@
             <a:fld id="{68590B17-2423-4E19-8A7C-17586BF463C2}" type="datetimeFigureOut">
               <a:rPr lang="en-US" smtClean="0"/>
               <a:pPr/>
-              <a:t>3/29/2019</a:t>
+              <a:t>4/4/2019</a:t>
             </a:fld>
             <a:endParaRPr lang="en-US"/>
           </a:p>
@@ -2050,7 +2050,7 @@
             <a:fld id="{53074F12-AA26-4AC8-9962-C36BB8F32554}" type="datetimeFigureOut">
               <a:rPr lang="en-US" smtClean="0"/>
               <a:pPr/>
-              <a:t>3/29/2019</a:t>
+              <a:t>4/4/2019</a:t>
             </a:fld>
             <a:endParaRPr lang="en-US"/>
           </a:p>
@@ -2328,7 +2328,7 @@
             <a:fld id="{53074F12-AA26-4AC8-9962-C36BB8F32554}" type="datetimeFigureOut">
               <a:rPr lang="en-US" smtClean="0"/>
               <a:pPr/>
-              <a:t>3/29/2019</a:t>
+              <a:t>4/4/2019</a:t>
             </a:fld>
             <a:endParaRPr lang="en-US"/>
           </a:p>
@@ -2548,7 +2548,7 @@
             <a:fld id="{53074F12-AA26-4AC8-9962-C36BB8F32554}" type="datetimeFigureOut">
               <a:rPr lang="en-US" smtClean="0"/>
               <a:pPr/>
-              <a:t>3/29/2019</a:t>
+              <a:t>4/4/2019</a:t>
             </a:fld>
             <a:endParaRPr lang="en-US"/>
           </a:p>
@@ -2778,7 +2778,7 @@
             <a:fld id="{53074F12-AA26-4AC8-9962-C36BB8F32554}" type="datetimeFigureOut">
               <a:rPr lang="en-US" smtClean="0"/>
               <a:pPr/>
-              <a:t>3/29/2019</a:t>
+              <a:t>4/4/2019</a:t>
             </a:fld>
             <a:endParaRPr lang="en-US"/>
           </a:p>
@@ -2844,7 +2844,7 @@
           <p:cNvPr id="7" name="Picture 6" descr="E:\websites\free-power-point-templates\2012\logos.png">
             <a:extLst>
               <a:ext uri="{FF2B5EF4-FFF2-40B4-BE49-F238E27FC236}">
-                <a16:creationId xmlns:a16="http://schemas.microsoft.com/office/drawing/2014/main" xmlns="" id="{D4DB3588-85A9-418E-BC89-D86945393835}"/>
+                <a16:creationId xmlns="" xmlns:a16="http://schemas.microsoft.com/office/drawing/2014/main" id="{D4DB3588-85A9-418E-BC89-D86945393835}"/>
               </a:ext>
             </a:extLst>
           </p:cNvPr>
@@ -3084,7 +3084,7 @@
             <a:fld id="{53074F12-AA26-4AC8-9962-C36BB8F32554}" type="datetimeFigureOut">
               <a:rPr lang="en-US" smtClean="0"/>
               <a:pPr/>
-              <a:t>3/29/2019</a:t>
+              <a:t>4/4/2019</a:t>
             </a:fld>
             <a:endParaRPr lang="en-US"/>
           </a:p>
@@ -3355,7 +3355,7 @@
             <a:fld id="{53074F12-AA26-4AC8-9962-C36BB8F32554}" type="datetimeFigureOut">
               <a:rPr lang="en-US" smtClean="0"/>
               <a:pPr/>
-              <a:t>3/29/2019</a:t>
+              <a:t>4/4/2019</a:t>
             </a:fld>
             <a:endParaRPr lang="en-US"/>
           </a:p>
@@ -3623,7 +3623,7 @@
             <a:fld id="{53074F12-AA26-4AC8-9962-C36BB8F32554}" type="datetimeFigureOut">
               <a:rPr lang="en-US" smtClean="0"/>
               <a:pPr/>
-              <a:t>3/29/2019</a:t>
+              <a:t>4/4/2019</a:t>
             </a:fld>
             <a:endParaRPr lang="en-US"/>
           </a:p>
@@ -3920,7 +3920,7 @@
             <a:fld id="{53074F12-AA26-4AC8-9962-C36BB8F32554}" type="datetimeFigureOut">
               <a:rPr lang="en-US" smtClean="0"/>
               <a:pPr/>
-              <a:t>3/29/2019</a:t>
+              <a:t>4/4/2019</a:t>
             </a:fld>
             <a:endParaRPr lang="en-US"/>
           </a:p>
@@ -4449,7 +4449,7 @@
             <a:fld id="{53074F12-AA26-4AC8-9962-C36BB8F32554}" type="datetimeFigureOut">
               <a:rPr lang="en-US" smtClean="0"/>
               <a:pPr/>
-              <a:t>3/29/2019</a:t>
+              <a:t>4/4/2019</a:t>
             </a:fld>
             <a:endParaRPr lang="en-US"/>
           </a:p>
@@ -4592,7 +4592,7 @@
             <a:fld id="{53074F12-AA26-4AC8-9962-C36BB8F32554}" type="datetimeFigureOut">
               <a:rPr lang="en-US" smtClean="0"/>
               <a:pPr/>
-              <a:t>3/29/2019</a:t>
+              <a:t>4/4/2019</a:t>
             </a:fld>
             <a:endParaRPr lang="en-US"/>
           </a:p>
@@ -4714,7 +4714,7 @@
             <a:fld id="{53074F12-AA26-4AC8-9962-C36BB8F32554}" type="datetimeFigureOut">
               <a:rPr lang="en-US" smtClean="0"/>
               <a:pPr/>
-              <a:t>3/29/2019</a:t>
+              <a:t>4/4/2019</a:t>
             </a:fld>
             <a:endParaRPr lang="en-US"/>
           </a:p>
@@ -5030,7 +5030,7 @@
             <a:fld id="{53074F12-AA26-4AC8-9962-C36BB8F32554}" type="datetimeFigureOut">
               <a:rPr lang="en-US" smtClean="0"/>
               <a:pPr/>
-              <a:t>3/29/2019</a:t>
+              <a:t>4/4/2019</a:t>
             </a:fld>
             <a:endParaRPr lang="en-US"/>
           </a:p>
@@ -5265,7 +5265,7 @@
             <a:fld id="{53074F12-AA26-4AC8-9962-C36BB8F32554}" type="datetimeFigureOut">
               <a:rPr lang="en-US" smtClean="0"/>
               <a:pPr/>
-              <a:t>3/29/2019</a:t>
+              <a:t>4/4/2019</a:t>
             </a:fld>
             <a:endParaRPr lang="en-US"/>
           </a:p>
@@ -5357,7 +5357,7 @@
           <p:cNvPr id="7" name="TextBox 6">
             <a:extLst>
               <a:ext uri="{FF2B5EF4-FFF2-40B4-BE49-F238E27FC236}">
-                <a16:creationId xmlns:a16="http://schemas.microsoft.com/office/drawing/2014/main" xmlns="" id="{20A5C643-EEBD-402F-BC34-A7927CA82180}"/>
+                <a16:creationId xmlns="" xmlns:a16="http://schemas.microsoft.com/office/drawing/2014/main" id="{20A5C643-EEBD-402F-BC34-A7927CA82180}"/>
               </a:ext>
             </a:extLst>
           </p:cNvPr>
@@ -17231,21 +17231,13 @@
           <a:p>
             <a:r>
               <a:rPr lang="en-US" dirty="0" smtClean="0"/>
-              <a:t>MVC </a:t>
-            </a:r>
-            <a:r>
-              <a:rPr lang="en-US" dirty="0" smtClean="0"/>
-              <a:t>authentication</a:t>
+              <a:t>MVC authentication</a:t>
             </a:r>
           </a:p>
           <a:p>
             <a:r>
               <a:rPr lang="en-US"/>
-              <a:t>Web </a:t>
-            </a:r>
-            <a:r>
-              <a:rPr lang="en-US"/>
-              <a:t>development </a:t>
+              <a:t>Web development </a:t>
             </a:r>
             <a:r>
               <a:rPr lang="en-US" smtClean="0"/>
@@ -17256,11 +17248,7 @@
           <a:p>
             <a:r>
               <a:rPr lang="en-US" dirty="0" smtClean="0"/>
-              <a:t>Angular </a:t>
-            </a:r>
-            <a:r>
-              <a:rPr lang="en-US" dirty="0" smtClean="0"/>
-              <a:t>Operations</a:t>
+              <a:t>Angular Operations</a:t>
             </a:r>
             <a:endParaRPr lang="en-US" dirty="0"/>
           </a:p>
@@ -17720,7 +17708,7 @@
         </p:blipFill>
         <p:spPr bwMode="auto">
           <a:xfrm>
-            <a:off x="1365195" y="2266340"/>
+            <a:off x="2739540" y="-200509"/>
             <a:ext cx="5905500" cy="2019301"/>
           </a:xfrm>
           <a:prstGeom prst="rect">
@@ -17738,6 +17726,459 @@
           </a:extLst>
         </p:spPr>
       </p:pic>
+      <p:sp>
+        <p:nvSpPr>
+          <p:cNvPr id="2" name="Rectangle 1"/>
+          <p:cNvSpPr/>
+          <p:nvPr/>
+        </p:nvSpPr>
+        <p:spPr>
+          <a:xfrm>
+            <a:off x="143555" y="1972816"/>
+            <a:ext cx="8856890" cy="3030326"/>
+          </a:xfrm>
+          <a:prstGeom prst="rect">
+            <a:avLst/>
+          </a:prstGeom>
+          <a:solidFill>
+            <a:schemeClr val="bg1"/>
+          </a:solidFill>
+        </p:spPr>
+        <p:style>
+          <a:lnRef idx="2">
+            <a:schemeClr val="accent1">
+              <a:shade val="50000"/>
+            </a:schemeClr>
+          </a:lnRef>
+          <a:fillRef idx="1">
+            <a:schemeClr val="accent1"/>
+          </a:fillRef>
+          <a:effectRef idx="0">
+            <a:schemeClr val="accent1"/>
+          </a:effectRef>
+          <a:fontRef idx="minor">
+            <a:schemeClr val="lt1"/>
+          </a:fontRef>
+        </p:style>
+        <p:txBody>
+          <a:bodyPr rtlCol="0" anchor="ctr"/>
+          <a:lstStyle/>
+          <a:p>
+            <a:pPr algn="ctr"/>
+            <a:endParaRPr lang="en-US"/>
+          </a:p>
+        </p:txBody>
+      </p:sp>
+      <p:pic>
+        <p:nvPicPr>
+          <p:cNvPr id="3" name="Picture 2" descr="Káº¿t quáº£ hÃ¬nh áº£nh cho user"/>
+          <p:cNvPicPr>
+            <a:picLocks noChangeAspect="1" noChangeArrowheads="1"/>
+          </p:cNvPicPr>
+          <p:nvPr/>
+        </p:nvPicPr>
+        <p:blipFill>
+          <a:blip r:embed="rId4" cstate="print">
+            <a:extLst>
+              <a:ext uri="{28A0092B-C50C-407E-A947-70E740481C1C}">
+                <a14:useLocalDpi xmlns:a14="http://schemas.microsoft.com/office/drawing/2010/main" val="0"/>
+              </a:ext>
+            </a:extLst>
+          </a:blip>
+          <a:srcRect/>
+          <a:stretch>
+            <a:fillRect/>
+          </a:stretch>
+        </p:blipFill>
+        <p:spPr bwMode="auto">
+          <a:xfrm>
+            <a:off x="448965" y="2904984"/>
+            <a:ext cx="1189765" cy="1189765"/>
+          </a:xfrm>
+          <a:prstGeom prst="rect">
+            <a:avLst/>
+          </a:prstGeom>
+          <a:noFill/>
+          <a:extLst>
+            <a:ext uri="{909E8E84-426E-40DD-AFC4-6F175D3DCCD1}">
+              <a14:hiddenFill xmlns:a14="http://schemas.microsoft.com/office/drawing/2010/main">
+                <a:solidFill>
+                  <a:srgbClr val="FFFFFF"/>
+                </a:solidFill>
+              </a14:hiddenFill>
+            </a:ext>
+          </a:extLst>
+        </p:spPr>
+      </p:pic>
+      <p:sp>
+        <p:nvSpPr>
+          <p:cNvPr id="5" name="Rectangle 4"/>
+          <p:cNvSpPr/>
+          <p:nvPr/>
+        </p:nvSpPr>
+        <p:spPr>
+          <a:xfrm>
+            <a:off x="4724705" y="2155414"/>
+            <a:ext cx="1221640" cy="609295"/>
+          </a:xfrm>
+          <a:prstGeom prst="rect">
+            <a:avLst/>
+          </a:prstGeom>
+        </p:spPr>
+        <p:style>
+          <a:lnRef idx="2">
+            <a:schemeClr val="accent1">
+              <a:shade val="50000"/>
+            </a:schemeClr>
+          </a:lnRef>
+          <a:fillRef idx="1">
+            <a:schemeClr val="accent1"/>
+          </a:fillRef>
+          <a:effectRef idx="0">
+            <a:schemeClr val="accent1"/>
+          </a:effectRef>
+          <a:fontRef idx="minor">
+            <a:schemeClr val="lt1"/>
+          </a:fontRef>
+        </p:style>
+        <p:txBody>
+          <a:bodyPr rtlCol="0" anchor="ctr"/>
+          <a:lstStyle/>
+          <a:p>
+            <a:pPr algn="ctr"/>
+            <a:r>
+              <a:rPr lang="en-US" dirty="0" smtClean="0"/>
+              <a:t>Login</a:t>
+            </a:r>
+          </a:p>
+          <a:p>
+            <a:pPr algn="ctr"/>
+            <a:r>
+              <a:rPr lang="en-US" dirty="0" smtClean="0"/>
+              <a:t>Controller</a:t>
+            </a:r>
+          </a:p>
+        </p:txBody>
+      </p:sp>
+      <p:sp>
+        <p:nvSpPr>
+          <p:cNvPr id="8" name="Rectangle 7"/>
+          <p:cNvSpPr/>
+          <p:nvPr/>
+        </p:nvSpPr>
+        <p:spPr>
+          <a:xfrm>
+            <a:off x="4724705" y="4251505"/>
+            <a:ext cx="1221640" cy="610820"/>
+          </a:xfrm>
+          <a:prstGeom prst="rect">
+            <a:avLst/>
+          </a:prstGeom>
+        </p:spPr>
+        <p:style>
+          <a:lnRef idx="2">
+            <a:schemeClr val="accent1">
+              <a:shade val="50000"/>
+            </a:schemeClr>
+          </a:lnRef>
+          <a:fillRef idx="1">
+            <a:schemeClr val="accent1"/>
+          </a:fillRef>
+          <a:effectRef idx="0">
+            <a:schemeClr val="accent1"/>
+          </a:effectRef>
+          <a:fontRef idx="minor">
+            <a:schemeClr val="lt1"/>
+          </a:fontRef>
+        </p:style>
+        <p:txBody>
+          <a:bodyPr rtlCol="0" anchor="ctr"/>
+          <a:lstStyle/>
+          <a:p>
+            <a:pPr algn="ctr"/>
+            <a:r>
+              <a:rPr lang="en-US" dirty="0" smtClean="0"/>
+              <a:t>My Page</a:t>
+            </a:r>
+          </a:p>
+          <a:p>
+            <a:pPr algn="ctr"/>
+            <a:r>
+              <a:rPr lang="en-US" dirty="0" smtClean="0"/>
+              <a:t>View</a:t>
+            </a:r>
+          </a:p>
+        </p:txBody>
+      </p:sp>
+      <p:sp>
+        <p:nvSpPr>
+          <p:cNvPr id="9" name="Rectangle 8"/>
+          <p:cNvSpPr/>
+          <p:nvPr/>
+        </p:nvSpPr>
+        <p:spPr>
+          <a:xfrm>
+            <a:off x="7383822" y="3206266"/>
+            <a:ext cx="1221639" cy="587199"/>
+          </a:xfrm>
+          <a:prstGeom prst="rect">
+            <a:avLst/>
+          </a:prstGeom>
+        </p:spPr>
+        <p:style>
+          <a:lnRef idx="2">
+            <a:schemeClr val="accent1">
+              <a:shade val="50000"/>
+            </a:schemeClr>
+          </a:lnRef>
+          <a:fillRef idx="1">
+            <a:schemeClr val="accent1"/>
+          </a:fillRef>
+          <a:effectRef idx="0">
+            <a:schemeClr val="accent1"/>
+          </a:effectRef>
+          <a:fontRef idx="minor">
+            <a:schemeClr val="lt1"/>
+          </a:fontRef>
+        </p:style>
+        <p:txBody>
+          <a:bodyPr rtlCol="0" anchor="ctr"/>
+          <a:lstStyle/>
+          <a:p>
+            <a:pPr algn="ctr"/>
+            <a:r>
+              <a:rPr lang="en-US" dirty="0" smtClean="0"/>
+              <a:t>Login</a:t>
+            </a:r>
+          </a:p>
+          <a:p>
+            <a:pPr algn="ctr"/>
+            <a:r>
+              <a:rPr lang="en-US" dirty="0" smtClean="0"/>
+              <a:t>Model</a:t>
+            </a:r>
+          </a:p>
+        </p:txBody>
+      </p:sp>
+      <p:sp>
+        <p:nvSpPr>
+          <p:cNvPr id="7" name="Rectangle 6"/>
+          <p:cNvSpPr/>
+          <p:nvPr/>
+        </p:nvSpPr>
+        <p:spPr>
+          <a:xfrm>
+            <a:off x="2654696" y="3206266"/>
+            <a:ext cx="1237720" cy="608990"/>
+          </a:xfrm>
+          <a:prstGeom prst="rect">
+            <a:avLst/>
+          </a:prstGeom>
+        </p:spPr>
+        <p:style>
+          <a:lnRef idx="2">
+            <a:schemeClr val="accent1">
+              <a:shade val="50000"/>
+            </a:schemeClr>
+          </a:lnRef>
+          <a:fillRef idx="1">
+            <a:schemeClr val="accent1"/>
+          </a:fillRef>
+          <a:effectRef idx="0">
+            <a:schemeClr val="accent1"/>
+          </a:effectRef>
+          <a:fontRef idx="minor">
+            <a:schemeClr val="lt1"/>
+          </a:fontRef>
+        </p:style>
+        <p:txBody>
+          <a:bodyPr rtlCol="0" anchor="ctr"/>
+          <a:lstStyle/>
+          <a:p>
+            <a:pPr algn="ctr"/>
+            <a:r>
+              <a:rPr lang="en-US" dirty="0" smtClean="0"/>
+              <a:t>Delegate</a:t>
+            </a:r>
+          </a:p>
+          <a:p>
+            <a:pPr algn="ctr"/>
+            <a:r>
+              <a:rPr lang="en-US" dirty="0" smtClean="0"/>
+              <a:t>handler</a:t>
+            </a:r>
+            <a:endParaRPr lang="en-US" dirty="0"/>
+          </a:p>
+        </p:txBody>
+      </p:sp>
+      <p:sp>
+        <p:nvSpPr>
+          <p:cNvPr id="10" name="Right Arrow 9"/>
+          <p:cNvSpPr/>
+          <p:nvPr/>
+        </p:nvSpPr>
+        <p:spPr>
+          <a:xfrm>
+            <a:off x="1688598" y="3206266"/>
+            <a:ext cx="916230" cy="281713"/>
+          </a:xfrm>
+          <a:prstGeom prst="rightArrow">
+            <a:avLst/>
+          </a:prstGeom>
+        </p:spPr>
+        <p:style>
+          <a:lnRef idx="1">
+            <a:schemeClr val="accent1"/>
+          </a:lnRef>
+          <a:fillRef idx="2">
+            <a:schemeClr val="accent1"/>
+          </a:fillRef>
+          <a:effectRef idx="1">
+            <a:schemeClr val="accent1"/>
+          </a:effectRef>
+          <a:fontRef idx="minor">
+            <a:schemeClr val="dk1"/>
+          </a:fontRef>
+        </p:style>
+        <p:txBody>
+          <a:bodyPr rtlCol="0" anchor="ctr"/>
+          <a:lstStyle/>
+          <a:p>
+            <a:pPr algn="ctr"/>
+            <a:r>
+              <a:rPr lang="en-US" sz="1000" b="1" dirty="0" smtClean="0"/>
+              <a:t>Request</a:t>
+            </a:r>
+            <a:endParaRPr lang="en-US" sz="1000" b="1" dirty="0"/>
+          </a:p>
+        </p:txBody>
+      </p:sp>
+      <p:sp>
+        <p:nvSpPr>
+          <p:cNvPr id="13" name="Right Arrow 12"/>
+          <p:cNvSpPr/>
+          <p:nvPr/>
+        </p:nvSpPr>
+        <p:spPr>
+          <a:xfrm rot="10800000" flipV="1">
+            <a:off x="1681587" y="3549180"/>
+            <a:ext cx="916230" cy="281713"/>
+          </a:xfrm>
+          <a:prstGeom prst="rightArrow">
+            <a:avLst/>
+          </a:prstGeom>
+        </p:spPr>
+        <p:style>
+          <a:lnRef idx="1">
+            <a:schemeClr val="accent1"/>
+          </a:lnRef>
+          <a:fillRef idx="2">
+            <a:schemeClr val="accent1"/>
+          </a:fillRef>
+          <a:effectRef idx="1">
+            <a:schemeClr val="accent1"/>
+          </a:effectRef>
+          <a:fontRef idx="minor">
+            <a:schemeClr val="dk1"/>
+          </a:fontRef>
+        </p:style>
+        <p:txBody>
+          <a:bodyPr rtlCol="0" anchor="ctr"/>
+          <a:lstStyle/>
+          <a:p>
+            <a:pPr algn="ctr"/>
+            <a:r>
+              <a:rPr lang="en-US" sz="1000" b="1" dirty="0" smtClean="0"/>
+              <a:t>Display</a:t>
+            </a:r>
+            <a:endParaRPr lang="en-US" sz="1000" b="1" dirty="0"/>
+          </a:p>
+        </p:txBody>
+      </p:sp>
+      <p:sp>
+        <p:nvSpPr>
+          <p:cNvPr id="18" name="Right Arrow 17"/>
+          <p:cNvSpPr/>
+          <p:nvPr/>
+        </p:nvSpPr>
+        <p:spPr>
+          <a:xfrm rot="20192814">
+            <a:off x="2815161" y="2527151"/>
+            <a:ext cx="1774615" cy="281713"/>
+          </a:xfrm>
+          <a:prstGeom prst="rightArrow">
+            <a:avLst/>
+          </a:prstGeom>
+        </p:spPr>
+        <p:style>
+          <a:lnRef idx="1">
+            <a:schemeClr val="accent1"/>
+          </a:lnRef>
+          <a:fillRef idx="2">
+            <a:schemeClr val="accent1"/>
+          </a:fillRef>
+          <a:effectRef idx="1">
+            <a:schemeClr val="accent1"/>
+          </a:effectRef>
+          <a:fontRef idx="minor">
+            <a:schemeClr val="dk1"/>
+          </a:fontRef>
+        </p:style>
+        <p:txBody>
+          <a:bodyPr rtlCol="0" anchor="ctr"/>
+          <a:lstStyle/>
+          <a:p>
+            <a:pPr algn="ctr"/>
+            <a:r>
+              <a:rPr lang="en-US" sz="1000" b="1" dirty="0" smtClean="0"/>
+              <a:t>Transfer Request</a:t>
+            </a:r>
+            <a:endParaRPr lang="en-US" sz="1000" b="1" dirty="0"/>
+          </a:p>
+        </p:txBody>
+      </p:sp>
+      <p:sp>
+        <p:nvSpPr>
+          <p:cNvPr id="19" name="Right Arrow 18"/>
+          <p:cNvSpPr/>
+          <p:nvPr/>
+        </p:nvSpPr>
+        <p:spPr>
+          <a:xfrm rot="9296480" flipV="1">
+            <a:off x="3487806" y="2714961"/>
+            <a:ext cx="1102179" cy="283464"/>
+          </a:xfrm>
+          <a:prstGeom prst="rightArrow">
+            <a:avLst/>
+          </a:prstGeom>
+        </p:spPr>
+        <p:style>
+          <a:lnRef idx="1">
+            <a:schemeClr val="accent1"/>
+          </a:lnRef>
+          <a:fillRef idx="2">
+            <a:schemeClr val="accent1"/>
+          </a:fillRef>
+          <a:effectRef idx="1">
+            <a:schemeClr val="accent1"/>
+          </a:effectRef>
+          <a:fontRef idx="minor">
+            <a:schemeClr val="dk1"/>
+          </a:fontRef>
+        </p:style>
+        <p:txBody>
+          <a:bodyPr rtlCol="0" anchor="ctr"/>
+          <a:lstStyle/>
+          <a:p>
+            <a:pPr algn="ctr"/>
+            <a:r>
+              <a:rPr lang="en-US" sz="1000" b="1" dirty="0" smtClean="0"/>
+              <a:t>Request</a:t>
+            </a:r>
+            <a:endParaRPr lang="en-US" sz="1000" b="1" dirty="0"/>
+          </a:p>
+        </p:txBody>
+      </p:sp>
     </p:spTree>
     <p:extLst>
       <p:ext uri="{BB962C8B-B14F-4D97-AF65-F5344CB8AC3E}">
@@ -18391,11 +18832,6 @@
               </a:rPr>
               <a:t>Can angular manage user roles and permissions? </a:t>
             </a:r>
-            <a:endParaRPr lang="en-US" sz="2400" dirty="0" smtClean="0">
-              <a:solidFill>
-                <a:schemeClr val="bg1"/>
-              </a:solidFill>
-            </a:endParaRPr>
           </a:p>
           <a:p>
             <a:r>
@@ -18412,31 +18848,15 @@
                   <a:schemeClr val="bg1"/>
                 </a:solidFill>
               </a:rPr>
-              <a:t>angular prevent users </a:t>
-            </a:r>
-            <a:r>
-              <a:rPr lang="en-US" sz="2400" dirty="0">
+              <a:t>angular prevent users from </a:t>
+            </a:r>
+            <a:r>
+              <a:rPr lang="en-US" sz="2400" dirty="0" smtClean="0">
                 <a:solidFill>
                   <a:schemeClr val="bg1"/>
                 </a:solidFill>
               </a:rPr>
-              <a:t>from </a:t>
-            </a:r>
-            <a:r>
-              <a:rPr lang="en-US" sz="2400" dirty="0" smtClean="0">
-                <a:solidFill>
-                  <a:schemeClr val="bg1"/>
-                </a:solidFill>
-              </a:rPr>
-              <a:t>accessing restricted areas</a:t>
-            </a:r>
-            <a:r>
-              <a:rPr lang="en-US" sz="2400" dirty="0" smtClean="0">
-                <a:solidFill>
-                  <a:schemeClr val="bg1"/>
-                </a:solidFill>
-              </a:rPr>
-              <a:t>?</a:t>
+              <a:t>accessing restricted areas?</a:t>
             </a:r>
             <a:endParaRPr lang="en-US" sz="2400" dirty="0">
               <a:solidFill>

</xml_diff>